<commit_message>
addedd new work functions
</commit_message>
<xml_diff>
--- a/Documptation & PPT/NomNomGo..pptx
+++ b/Documptation & PPT/NomNomGo..pptx
@@ -10320,7 +10320,7 @@
           <a:p>
             <a:fld id="{D65BACFC-094F-4916-A007-910D6B75B2B1}" type="datetimeFigureOut">
               <a:rPr lang="en-IN" smtClean="0"/>
-              <a:t>30-03-2025</a:t>
+              <a:t>01-04-2025</a:t>
             </a:fld>
             <a:endParaRPr lang="en-IN"/>
           </a:p>
@@ -10965,7 +10965,7 @@
           <a:p>
             <a:fld id="{48A87A34-81AB-432B-8DAE-1953F412C126}" type="datetimeFigureOut">
               <a:rPr lang="en-US" smtClean="0"/>
-              <a:t>3/30/2025</a:t>
+              <a:t>4/1/2025</a:t>
             </a:fld>
             <a:endParaRPr lang="en-US" dirty="0"/>
           </a:p>
@@ -11263,7 +11263,7 @@
           <a:p>
             <a:fld id="{48A87A34-81AB-432B-8DAE-1953F412C126}" type="datetimeFigureOut">
               <a:rPr lang="en-US" smtClean="0"/>
-              <a:t>3/30/2025</a:t>
+              <a:t>4/1/2025</a:t>
             </a:fld>
             <a:endParaRPr lang="en-US" dirty="0"/>
           </a:p>
@@ -11455,7 +11455,7 @@
           <a:p>
             <a:fld id="{48A87A34-81AB-432B-8DAE-1953F412C126}" type="datetimeFigureOut">
               <a:rPr lang="en-US" smtClean="0"/>
-              <a:t>3/30/2025</a:t>
+              <a:t>4/1/2025</a:t>
             </a:fld>
             <a:endParaRPr lang="en-US" dirty="0"/>
           </a:p>
@@ -11716,7 +11716,7 @@
           <a:p>
             <a:fld id="{48A87A34-81AB-432B-8DAE-1953F412C126}" type="datetimeFigureOut">
               <a:rPr lang="en-US" smtClean="0"/>
-              <a:t>3/30/2025</a:t>
+              <a:t>4/1/2025</a:t>
             </a:fld>
             <a:endParaRPr lang="en-US" dirty="0"/>
           </a:p>
@@ -12140,7 +12140,7 @@
           <a:p>
             <a:fld id="{48A87A34-81AB-432B-8DAE-1953F412C126}" type="datetimeFigureOut">
               <a:rPr lang="en-US" smtClean="0"/>
-              <a:t>3/30/2025</a:t>
+              <a:t>4/1/2025</a:t>
             </a:fld>
             <a:endParaRPr lang="en-US" dirty="0"/>
           </a:p>
@@ -12677,7 +12677,7 @@
           <a:p>
             <a:fld id="{48A87A34-81AB-432B-8DAE-1953F412C126}" type="datetimeFigureOut">
               <a:rPr lang="en-US" smtClean="0"/>
-              <a:t>3/30/2025</a:t>
+              <a:t>4/1/2025</a:t>
             </a:fld>
             <a:endParaRPr lang="en-US" dirty="0"/>
           </a:p>
@@ -13541,7 +13541,7 @@
           <a:p>
             <a:fld id="{48A87A34-81AB-432B-8DAE-1953F412C126}" type="datetimeFigureOut">
               <a:rPr lang="en-US" smtClean="0"/>
-              <a:t>3/30/2025</a:t>
+              <a:t>4/1/2025</a:t>
             </a:fld>
             <a:endParaRPr lang="en-US" dirty="0"/>
           </a:p>
@@ -13711,7 +13711,7 @@
           <a:p>
             <a:fld id="{48A87A34-81AB-432B-8DAE-1953F412C126}" type="datetimeFigureOut">
               <a:rPr lang="en-US" smtClean="0"/>
-              <a:t>3/30/2025</a:t>
+              <a:t>4/1/2025</a:t>
             </a:fld>
             <a:endParaRPr lang="en-US" dirty="0"/>
           </a:p>
@@ -13895,7 +13895,7 @@
           <a:p>
             <a:fld id="{48A87A34-81AB-432B-8DAE-1953F412C126}" type="datetimeFigureOut">
               <a:rPr lang="en-US" smtClean="0"/>
-              <a:t>3/30/2025</a:t>
+              <a:t>4/1/2025</a:t>
             </a:fld>
             <a:endParaRPr lang="en-US" dirty="0"/>
           </a:p>
@@ -14065,7 +14065,7 @@
           <a:p>
             <a:fld id="{48A87A34-81AB-432B-8DAE-1953F412C126}" type="datetimeFigureOut">
               <a:rPr lang="en-US" smtClean="0"/>
-              <a:t>3/30/2025</a:t>
+              <a:t>4/1/2025</a:t>
             </a:fld>
             <a:endParaRPr lang="en-US" dirty="0"/>
           </a:p>
@@ -14309,7 +14309,7 @@
           <a:p>
             <a:fld id="{48A87A34-81AB-432B-8DAE-1953F412C126}" type="datetimeFigureOut">
               <a:rPr lang="en-US" smtClean="0"/>
-              <a:t>3/30/2025</a:t>
+              <a:t>4/1/2025</a:t>
             </a:fld>
             <a:endParaRPr lang="en-US" dirty="0"/>
           </a:p>
@@ -14545,7 +14545,7 @@
           <a:p>
             <a:fld id="{48A87A34-81AB-432B-8DAE-1953F412C126}" type="datetimeFigureOut">
               <a:rPr lang="en-US" smtClean="0"/>
-              <a:t>3/30/2025</a:t>
+              <a:t>4/1/2025</a:t>
             </a:fld>
             <a:endParaRPr lang="en-US" dirty="0"/>
           </a:p>
@@ -15011,7 +15011,7 @@
           <a:p>
             <a:fld id="{48A87A34-81AB-432B-8DAE-1953F412C126}" type="datetimeFigureOut">
               <a:rPr lang="en-US" smtClean="0"/>
-              <a:t>3/30/2025</a:t>
+              <a:t>4/1/2025</a:t>
             </a:fld>
             <a:endParaRPr lang="en-US" dirty="0"/>
           </a:p>
@@ -15129,7 +15129,7 @@
           <a:p>
             <a:fld id="{48A87A34-81AB-432B-8DAE-1953F412C126}" type="datetimeFigureOut">
               <a:rPr lang="en-US" smtClean="0"/>
-              <a:t>3/30/2025</a:t>
+              <a:t>4/1/2025</a:t>
             </a:fld>
             <a:endParaRPr lang="en-US" dirty="0"/>
           </a:p>
@@ -15224,7 +15224,7 @@
           <a:p>
             <a:fld id="{48A87A34-81AB-432B-8DAE-1953F412C126}" type="datetimeFigureOut">
               <a:rPr lang="en-US" smtClean="0"/>
-              <a:t>3/30/2025</a:t>
+              <a:t>4/1/2025</a:t>
             </a:fld>
             <a:endParaRPr lang="en-US" dirty="0"/>
           </a:p>
@@ -15479,7 +15479,7 @@
           <a:p>
             <a:fld id="{48A87A34-81AB-432B-8DAE-1953F412C126}" type="datetimeFigureOut">
               <a:rPr lang="en-US" smtClean="0"/>
-              <a:t>3/30/2025</a:t>
+              <a:t>4/1/2025</a:t>
             </a:fld>
             <a:endParaRPr lang="en-US" dirty="0"/>
           </a:p>
@@ -15779,7 +15779,7 @@
           <a:p>
             <a:fld id="{48A87A34-81AB-432B-8DAE-1953F412C126}" type="datetimeFigureOut">
               <a:rPr lang="en-US" smtClean="0"/>
-              <a:t>3/30/2025</a:t>
+              <a:t>4/1/2025</a:t>
             </a:fld>
             <a:endParaRPr lang="en-US" dirty="0"/>
           </a:p>
@@ -16014,7 +16014,7 @@
             <a:fld id="{48A87A34-81AB-432B-8DAE-1953F412C126}" type="datetimeFigureOut">
               <a:rPr lang="en-US" smtClean="0"/>
               <a:pPr/>
-              <a:t>3/30/2025</a:t>
+              <a:t>4/1/2025</a:t>
             </a:fld>
             <a:endParaRPr lang="en-US" dirty="0"/>
           </a:p>
@@ -16983,7 +16983,7 @@
                 <a:ea typeface="Calibri" panose="020F0502020204030204" pitchFamily="34" charset="0"/>
                 <a:cs typeface="Times New Roman" panose="02020603050405020304" pitchFamily="18" charset="0"/>
               </a:rPr>
-              <a:t>						Prof. Hetal Mehta</a:t>
+              <a:t>	(71--)					Prof. Hetal Mehta</a:t>
             </a:r>
             <a:endParaRPr lang="en-IN" kern="100" dirty="0">
               <a:solidFill>
@@ -18236,6 +18236,58 @@
           </a:prstGeom>
         </p:spPr>
       </p:pic>
+      <p:sp>
+        <p:nvSpPr>
+          <p:cNvPr id="2" name="Rectangle 1">
+            <a:extLst>
+              <a:ext uri="{FF2B5EF4-FFF2-40B4-BE49-F238E27FC236}">
+                <a16:creationId xmlns:a16="http://schemas.microsoft.com/office/drawing/2014/main" id="{60648768-B5C6-4F48-6ACD-1FAF58193FD3}"/>
+              </a:ext>
+            </a:extLst>
+          </p:cNvPr>
+          <p:cNvSpPr/>
+          <p:nvPr/>
+        </p:nvSpPr>
+        <p:spPr>
+          <a:xfrm>
+            <a:off x="2794141" y="1455174"/>
+            <a:ext cx="7706711" cy="4788310"/>
+          </a:xfrm>
+          <a:prstGeom prst="rect">
+            <a:avLst/>
+          </a:prstGeom>
+          <a:noFill/>
+          <a:ln>
+            <a:solidFill>
+              <a:schemeClr val="bg1"/>
+            </a:solidFill>
+          </a:ln>
+        </p:spPr>
+        <p:style>
+          <a:lnRef idx="2">
+            <a:schemeClr val="accent1">
+              <a:shade val="15000"/>
+            </a:schemeClr>
+          </a:lnRef>
+          <a:fillRef idx="1">
+            <a:schemeClr val="accent1"/>
+          </a:fillRef>
+          <a:effectRef idx="0">
+            <a:schemeClr val="accent1"/>
+          </a:effectRef>
+          <a:fontRef idx="minor">
+            <a:schemeClr val="lt1"/>
+          </a:fontRef>
+        </p:style>
+        <p:txBody>
+          <a:bodyPr rtlCol="0" anchor="ctr"/>
+          <a:lstStyle/>
+          <a:p>
+            <a:pPr algn="ctr"/>
+            <a:endParaRPr lang="en-IN"/>
+          </a:p>
+        </p:txBody>
+      </p:sp>
     </p:spTree>
     <p:extLst>
       <p:ext uri="{BB962C8B-B14F-4D97-AF65-F5344CB8AC3E}">

</xml_diff>